<commit_message>
Change: Continued work on the Powerpoint
</commit_message>
<xml_diff>
--- a/Deep Dive into ML.NET  - 3.22.2019/Deep dive into ml.pptx
+++ b/Deep Dive into ML.NET  - 3.22.2019/Deep dive into ml.pptx
@@ -8,6 +8,7 @@
     <p:sldId id="256" r:id="rId2"/>
     <p:sldId id="257" r:id="rId3"/>
     <p:sldId id="258" r:id="rId4"/>
+    <p:sldId id="260" r:id="rId5"/>
   </p:sldIdLst>
   <p:sldSz cx="12192000" cy="6858000"/>
   <p:notesSz cx="6858000" cy="9144000"/>
@@ -106,6 +107,11 @@
       </a:defRPr>
     </a:lvl9pPr>
   </p:defaultTextStyle>
+  <p:extLst>
+    <p:ext uri="{EFAFB233-063F-42B5-8137-9DF3F51BA10A}">
+      <p15:sldGuideLst xmlns:p15="http://schemas.microsoft.com/office/powerpoint/2012/main"/>
+    </p:ext>
+  </p:extLst>
 </p:presentation>
 </file>
 
@@ -323,7 +329,7 @@
             <a:fld id="{B61BEF0D-F0BB-DE4B-95CE-6DB70DBA9567}" type="datetimeFigureOut">
               <a:rPr lang="en-US" dirty="0"/>
               <a:pPr/>
-              <a:t>3/17/2019</a:t>
+              <a:t>3/18/2019</a:t>
             </a:fld>
             <a:endParaRPr lang="en-US" dirty="0"/>
           </a:p>
@@ -611,7 +617,7 @@
             <a:fld id="{B61BEF0D-F0BB-DE4B-95CE-6DB70DBA9567}" type="datetimeFigureOut">
               <a:rPr lang="en-US" dirty="0"/>
               <a:pPr/>
-              <a:t>3/17/2019</a:t>
+              <a:t>3/18/2019</a:t>
             </a:fld>
             <a:endParaRPr lang="en-US" dirty="0"/>
           </a:p>
@@ -867,7 +873,7 @@
             <a:fld id="{B61BEF0D-F0BB-DE4B-95CE-6DB70DBA9567}" type="datetimeFigureOut">
               <a:rPr lang="en-US" dirty="0"/>
               <a:pPr/>
-              <a:t>3/17/2019</a:t>
+              <a:t>3/18/2019</a:t>
             </a:fld>
             <a:endParaRPr lang="en-US" dirty="0"/>
           </a:p>
@@ -1333,7 +1339,7 @@
             <a:fld id="{B61BEF0D-F0BB-DE4B-95CE-6DB70DBA9567}" type="datetimeFigureOut">
               <a:rPr lang="en-US" dirty="0"/>
               <a:pPr/>
-              <a:t>3/17/2019</a:t>
+              <a:t>3/18/2019</a:t>
             </a:fld>
             <a:endParaRPr lang="en-US" dirty="0"/>
           </a:p>
@@ -1510,7 +1516,7 @@
             <a:fld id="{B61BEF0D-F0BB-DE4B-95CE-6DB70DBA9567}" type="datetimeFigureOut">
               <a:rPr lang="en-US" dirty="0"/>
               <a:pPr/>
-              <a:t>3/17/2019</a:t>
+              <a:t>3/18/2019</a:t>
             </a:fld>
             <a:endParaRPr lang="en-US" dirty="0"/>
           </a:p>
@@ -2083,7 +2089,7 @@
             <a:fld id="{B61BEF0D-F0BB-DE4B-95CE-6DB70DBA9567}" type="datetimeFigureOut">
               <a:rPr lang="en-US" dirty="0"/>
               <a:pPr/>
-              <a:t>3/17/2019</a:t>
+              <a:t>3/18/2019</a:t>
             </a:fld>
             <a:endParaRPr lang="en-US" dirty="0"/>
           </a:p>
@@ -2412,7 +2418,7 @@
             <a:fld id="{B61BEF0D-F0BB-DE4B-95CE-6DB70DBA9567}" type="datetimeFigureOut">
               <a:rPr lang="en-US" dirty="0"/>
               <a:pPr/>
-              <a:t>3/17/2019</a:t>
+              <a:t>3/18/2019</a:t>
             </a:fld>
             <a:endParaRPr lang="en-US" dirty="0"/>
           </a:p>
@@ -2584,7 +2590,7 @@
             <a:fld id="{B61BEF0D-F0BB-DE4B-95CE-6DB70DBA9567}" type="datetimeFigureOut">
               <a:rPr lang="en-US" dirty="0"/>
               <a:pPr/>
-              <a:t>3/17/2019</a:t>
+              <a:t>3/18/2019</a:t>
             </a:fld>
             <a:endParaRPr lang="en-US" dirty="0"/>
           </a:p>
@@ -2761,7 +2767,7 @@
             <a:fld id="{B61BEF0D-F0BB-DE4B-95CE-6DB70DBA9567}" type="datetimeFigureOut">
               <a:rPr lang="en-US" dirty="0"/>
               <a:pPr/>
-              <a:t>3/17/2019</a:t>
+              <a:t>3/18/2019</a:t>
             </a:fld>
             <a:endParaRPr lang="en-US" dirty="0"/>
           </a:p>
@@ -2928,7 +2934,7 @@
             <a:fld id="{B61BEF0D-F0BB-DE4B-95CE-6DB70DBA9567}" type="datetimeFigureOut">
               <a:rPr lang="en-US" dirty="0"/>
               <a:pPr/>
-              <a:t>3/17/2019</a:t>
+              <a:t>3/18/2019</a:t>
             </a:fld>
             <a:endParaRPr lang="en-US" dirty="0"/>
           </a:p>
@@ -3182,7 +3188,7 @@
             <a:fld id="{B61BEF0D-F0BB-DE4B-95CE-6DB70DBA9567}" type="datetimeFigureOut">
               <a:rPr lang="en-US" dirty="0"/>
               <a:pPr/>
-              <a:t>3/17/2019</a:t>
+              <a:t>3/18/2019</a:t>
             </a:fld>
             <a:endParaRPr lang="en-US" dirty="0"/>
           </a:p>
@@ -3471,7 +3477,7 @@
             <a:fld id="{B61BEF0D-F0BB-DE4B-95CE-6DB70DBA9567}" type="datetimeFigureOut">
               <a:rPr lang="en-US" dirty="0"/>
               <a:pPr/>
-              <a:t>3/17/2019</a:t>
+              <a:t>3/18/2019</a:t>
             </a:fld>
             <a:endParaRPr lang="en-US" dirty="0"/>
           </a:p>
@@ -3898,7 +3904,7 @@
             <a:fld id="{B61BEF0D-F0BB-DE4B-95CE-6DB70DBA9567}" type="datetimeFigureOut">
               <a:rPr lang="en-US" dirty="0"/>
               <a:pPr/>
-              <a:t>3/17/2019</a:t>
+              <a:t>3/18/2019</a:t>
             </a:fld>
             <a:endParaRPr lang="en-US" dirty="0"/>
           </a:p>
@@ -4013,7 +4019,7 @@
             <a:fld id="{B61BEF0D-F0BB-DE4B-95CE-6DB70DBA9567}" type="datetimeFigureOut">
               <a:rPr lang="en-US" dirty="0"/>
               <a:pPr/>
-              <a:t>3/17/2019</a:t>
+              <a:t>3/18/2019</a:t>
             </a:fld>
             <a:endParaRPr lang="en-US" dirty="0"/>
           </a:p>
@@ -4105,7 +4111,7 @@
             <a:fld id="{B61BEF0D-F0BB-DE4B-95CE-6DB70DBA9567}" type="datetimeFigureOut">
               <a:rPr lang="en-US" dirty="0"/>
               <a:pPr/>
-              <a:t>3/17/2019</a:t>
+              <a:t>3/18/2019</a:t>
             </a:fld>
             <a:endParaRPr lang="en-US" dirty="0"/>
           </a:p>
@@ -4385,7 +4391,7 @@
             <a:fld id="{B61BEF0D-F0BB-DE4B-95CE-6DB70DBA9567}" type="datetimeFigureOut">
               <a:rPr lang="en-US" dirty="0"/>
               <a:pPr/>
-              <a:t>3/17/2019</a:t>
+              <a:t>3/18/2019</a:t>
             </a:fld>
             <a:endParaRPr lang="en-US" dirty="0"/>
           </a:p>
@@ -4673,7 +4679,7 @@
             <a:fld id="{B61BEF0D-F0BB-DE4B-95CE-6DB70DBA9567}" type="datetimeFigureOut">
               <a:rPr lang="en-US" dirty="0"/>
               <a:pPr/>
-              <a:t>3/17/2019</a:t>
+              <a:t>3/18/2019</a:t>
             </a:fld>
             <a:endParaRPr lang="en-US" dirty="0"/>
           </a:p>
@@ -4901,7 +4907,7 @@
             <a:fld id="{B61BEF0D-F0BB-DE4B-95CE-6DB70DBA9567}" type="datetimeFigureOut">
               <a:rPr lang="en-US" dirty="0"/>
               <a:pPr/>
-              <a:t>3/17/2019</a:t>
+              <a:t>3/18/2019</a:t>
             </a:fld>
             <a:endParaRPr lang="en-US" dirty="0"/>
           </a:p>
@@ -5796,7 +5802,12 @@
             <p:ph idx="1"/>
           </p:nvPr>
         </p:nvSpPr>
-        <p:spPr/>
+        <p:spPr>
+          <a:xfrm>
+            <a:off x="1141413" y="1933574"/>
+            <a:ext cx="9905998" cy="3124201"/>
+          </a:xfrm>
+        </p:spPr>
         <p:txBody>
           <a:bodyPr>
             <a:normAutofit fontScale="70000" lnSpcReduction="20000"/>
@@ -5932,31 +5943,6 @@
       </p:grpSpPr>
       <p:sp>
         <p:nvSpPr>
-          <p:cNvPr id="2" name="Title 1">
-            <a:extLst>
-              <a:ext uri="{FF2B5EF4-FFF2-40B4-BE49-F238E27FC236}">
-                <a16:creationId xmlns:a16="http://schemas.microsoft.com/office/drawing/2014/main" id="{81FE7094-03F6-46DC-A560-26CDAE313AE2}"/>
-              </a:ext>
-            </a:extLst>
-          </p:cNvPr>
-          <p:cNvSpPr>
-            <a:spLocks noGrp="1"/>
-          </p:cNvSpPr>
-          <p:nvPr>
-            <p:ph type="title"/>
-          </p:nvPr>
-        </p:nvSpPr>
-        <p:spPr/>
-        <p:txBody>
-          <a:bodyPr/>
-          <a:lstStyle/>
-          <a:p>
-            <a:endParaRPr lang="en-US" dirty="0"/>
-          </a:p>
-        </p:txBody>
-      </p:sp>
-      <p:sp>
-        <p:nvSpPr>
           <p:cNvPr id="3" name="Content Placeholder 2">
             <a:extLst>
               <a:ext uri="{FF2B5EF4-FFF2-40B4-BE49-F238E27FC236}">
@@ -5976,7 +5962,10 @@
           <a:bodyPr/>
           <a:lstStyle/>
           <a:p>
-            <a:endParaRPr lang="en-US"/>
+            <a:r>
+              <a:rPr lang="en-US" dirty="0"/>
+              <a:t>Cover architecture here</a:t>
+            </a:r>
           </a:p>
         </p:txBody>
       </p:sp>
@@ -5984,6 +5973,71 @@
     <p:extLst>
       <p:ext uri="{BB962C8B-B14F-4D97-AF65-F5344CB8AC3E}">
         <p14:creationId xmlns:p14="http://schemas.microsoft.com/office/powerpoint/2010/main" val="3698359742"/>
+      </p:ext>
+    </p:extLst>
+  </p:cSld>
+  <p:clrMapOvr>
+    <a:masterClrMapping/>
+  </p:clrMapOvr>
+</p:sld>
+</file>
+
+<file path=ppt/slides/slide4.xml><?xml version="1.0" encoding="utf-8"?>
+<p:sld xmlns:a="http://schemas.openxmlformats.org/drawingml/2006/main" xmlns:r="http://schemas.openxmlformats.org/officeDocument/2006/relationships" xmlns:p="http://schemas.openxmlformats.org/presentationml/2006/main">
+  <p:cSld>
+    <p:spTree>
+      <p:nvGrpSpPr>
+        <p:cNvPr id="1" name=""/>
+        <p:cNvGrpSpPr/>
+        <p:nvPr/>
+      </p:nvGrpSpPr>
+      <p:grpSpPr>
+        <a:xfrm>
+          <a:off x="0" y="0"/>
+          <a:ext cx="0" cy="0"/>
+          <a:chOff x="0" y="0"/>
+          <a:chExt cx="0" cy="0"/>
+        </a:xfrm>
+      </p:grpSpPr>
+      <p:sp>
+        <p:nvSpPr>
+          <p:cNvPr id="2" name="TextBox 1">
+            <a:extLst>
+              <a:ext uri="{FF2B5EF4-FFF2-40B4-BE49-F238E27FC236}">
+                <a16:creationId xmlns:a16="http://schemas.microsoft.com/office/drawing/2014/main" id="{9EAA71E5-B695-45BF-B357-5FDD052DA674}"/>
+              </a:ext>
+            </a:extLst>
+          </p:cNvPr>
+          <p:cNvSpPr txBox="1"/>
+          <p:nvPr/>
+        </p:nvSpPr>
+        <p:spPr>
+          <a:xfrm>
+            <a:off x="4317308" y="3013502"/>
+            <a:ext cx="3557384" cy="830997"/>
+          </a:xfrm>
+          <a:prstGeom prst="rect">
+            <a:avLst/>
+          </a:prstGeom>
+          <a:noFill/>
+        </p:spPr>
+        <p:txBody>
+          <a:bodyPr wrap="none" rtlCol="0">
+            <a:spAutoFit/>
+          </a:bodyPr>
+          <a:lstStyle/>
+          <a:p>
+            <a:r>
+              <a:rPr lang="en-US" sz="4800" dirty="0"/>
+              <a:t>Demo Time</a:t>
+            </a:r>
+          </a:p>
+        </p:txBody>
+      </p:sp>
+    </p:spTree>
+    <p:extLst>
+      <p:ext uri="{BB962C8B-B14F-4D97-AF65-F5344CB8AC3E}">
+        <p14:creationId xmlns:p14="http://schemas.microsoft.com/office/powerpoint/2010/main" val="2711250058"/>
       </p:ext>
     </p:extLst>
   </p:cSld>

</xml_diff>